<commit_message>
sent data to sql
</commit_message>
<xml_diff>
--- a/@requirements/HW 2/Homework 2.pptx
+++ b/@requirements/HW 2/Homework 2.pptx
@@ -371,7 +371,7 @@
           <a:p>
             <a:fld id="{B277EC77-3A8D-471E-94F2-81AF5CB0F055}" type="datetimeFigureOut">
               <a:rPr lang="zh-TW" altLang="en-US" smtClean="0"/>
-              <a:t>2021/10/27</a:t>
+              <a:t>2021/10/28</a:t>
             </a:fld>
             <a:endParaRPr lang="zh-TW" altLang="en-US"/>
           </a:p>
@@ -552,7 +552,7 @@
           <a:p>
             <a:fld id="{B277EC77-3A8D-471E-94F2-81AF5CB0F055}" type="datetimeFigureOut">
               <a:rPr lang="zh-TW" altLang="en-US" smtClean="0"/>
-              <a:t>2021/10/27</a:t>
+              <a:t>2021/10/28</a:t>
             </a:fld>
             <a:endParaRPr lang="zh-TW" altLang="en-US"/>
           </a:p>
@@ -681,7 +681,7 @@
           <a:p>
             <a:fld id="{B277EC77-3A8D-471E-94F2-81AF5CB0F055}" type="datetimeFigureOut">
               <a:rPr lang="zh-TW" altLang="en-US" smtClean="0"/>
-              <a:t>2021/10/27</a:t>
+              <a:t>2021/10/28</a:t>
             </a:fld>
             <a:endParaRPr lang="zh-TW" altLang="en-US"/>
           </a:p>
@@ -776,7 +776,7 @@
           <a:p>
             <a:fld id="{B277EC77-3A8D-471E-94F2-81AF5CB0F055}" type="datetimeFigureOut">
               <a:rPr lang="zh-TW" altLang="en-US" smtClean="0"/>
-              <a:t>2021/10/27</a:t>
+              <a:t>2021/10/28</a:t>
             </a:fld>
             <a:endParaRPr lang="zh-TW" altLang="en-US"/>
           </a:p>
@@ -1019,7 +1019,7 @@
           <a:p>
             <a:fld id="{B277EC77-3A8D-471E-94F2-81AF5CB0F055}" type="datetimeFigureOut">
               <a:rPr lang="zh-TW" altLang="en-US" smtClean="0"/>
-              <a:t>2021/10/27</a:t>
+              <a:t>2021/10/28</a:t>
             </a:fld>
             <a:endParaRPr lang="zh-TW" altLang="en-US"/>
           </a:p>
@@ -1200,7 +1200,7 @@
           <a:p>
             <a:fld id="{B277EC77-3A8D-471E-94F2-81AF5CB0F055}" type="datetimeFigureOut">
               <a:rPr lang="zh-TW" altLang="en-US" smtClean="0"/>
-              <a:t>2021/10/27</a:t>
+              <a:t>2021/10/28</a:t>
             </a:fld>
             <a:endParaRPr lang="zh-TW" altLang="en-US"/>
           </a:p>
@@ -1443,7 +1443,7 @@
           <a:p>
             <a:fld id="{B277EC77-3A8D-471E-94F2-81AF5CB0F055}" type="datetimeFigureOut">
               <a:rPr lang="zh-TW" altLang="en-US" smtClean="0"/>
-              <a:t>2021/10/27</a:t>
+              <a:t>2021/10/28</a:t>
             </a:fld>
             <a:endParaRPr lang="zh-TW" altLang="en-US"/>
           </a:p>
@@ -1717,7 +1717,7 @@
           <a:p>
             <a:fld id="{B277EC77-3A8D-471E-94F2-81AF5CB0F055}" type="datetimeFigureOut">
               <a:rPr lang="zh-TW" altLang="en-US" smtClean="0"/>
-              <a:t>2021/10/27</a:t>
+              <a:t>2021/10/28</a:t>
             </a:fld>
             <a:endParaRPr lang="zh-TW" altLang="en-US"/>
           </a:p>
@@ -3199,11 +3199,11 @@
           </a:p>
           <a:p>
             <a:r>
-              <a:rPr lang="zh-TW" altLang="en-US" dirty="0"/>
+              <a:rPr lang="zh-TW" altLang="en-US" strike="sngStrike" dirty="0"/>
               <a:t>報名資訊存入資料庫 </a:t>
             </a:r>
             <a:r>
-              <a:rPr lang="en-US" altLang="zh-TW" dirty="0"/>
+              <a:rPr lang="en-US" altLang="zh-TW" strike="sngStrike" dirty="0"/>
               <a:t>+10</a:t>
             </a:r>
           </a:p>

</xml_diff>